<commit_message>
Fix bug in 07 ppt
</commit_message>
<xml_diff>
--- a/07 云台控制/07 自动瞄准-云台控制.pptx
+++ b/07 云台控制/07 自动瞄准-云台控制.pptx
@@ -202,7 +202,7 @@
           <a:p>
             <a:fld id="{3A33E72D-B369-482C-8E75-C72865680BD7}" type="datetimeFigureOut">
               <a:rPr lang="zh-CN" altLang="en-US" smtClean="0"/>
-              <a:t>2021/10/31</a:t>
+              <a:t>2021/11/2</a:t>
             </a:fld>
             <a:endParaRPr lang="zh-CN" altLang="en-US"/>
           </a:p>
@@ -850,7 +850,7 @@
           <a:p>
             <a:fld id="{C39C68C5-D724-4B50-A561-B354F4A5D368}" type="datetimeFigureOut">
               <a:rPr lang="zh-CN" altLang="en-US" smtClean="0"/>
-              <a:t>2021/10/31</a:t>
+              <a:t>2021/11/2</a:t>
             </a:fld>
             <a:endParaRPr lang="zh-CN" altLang="en-US"/>
           </a:p>
@@ -1018,7 +1018,7 @@
           <a:p>
             <a:fld id="{C39C68C5-D724-4B50-A561-B354F4A5D368}" type="datetimeFigureOut">
               <a:rPr lang="zh-CN" altLang="en-US" smtClean="0"/>
-              <a:t>2021/10/31</a:t>
+              <a:t>2021/11/2</a:t>
             </a:fld>
             <a:endParaRPr lang="zh-CN" altLang="en-US"/>
           </a:p>
@@ -1196,7 +1196,7 @@
           <a:p>
             <a:fld id="{C39C68C5-D724-4B50-A561-B354F4A5D368}" type="datetimeFigureOut">
               <a:rPr lang="zh-CN" altLang="en-US" smtClean="0"/>
-              <a:t>2021/10/31</a:t>
+              <a:t>2021/11/2</a:t>
             </a:fld>
             <a:endParaRPr lang="zh-CN" altLang="en-US"/>
           </a:p>
@@ -1364,7 +1364,7 @@
           <a:p>
             <a:fld id="{C39C68C5-D724-4B50-A561-B354F4A5D368}" type="datetimeFigureOut">
               <a:rPr lang="zh-CN" altLang="en-US" smtClean="0"/>
-              <a:t>2021/10/31</a:t>
+              <a:t>2021/11/2</a:t>
             </a:fld>
             <a:endParaRPr lang="zh-CN" altLang="en-US"/>
           </a:p>
@@ -1609,7 +1609,7 @@
           <a:p>
             <a:fld id="{C39C68C5-D724-4B50-A561-B354F4A5D368}" type="datetimeFigureOut">
               <a:rPr lang="zh-CN" altLang="en-US" smtClean="0"/>
-              <a:t>2021/10/31</a:t>
+              <a:t>2021/11/2</a:t>
             </a:fld>
             <a:endParaRPr lang="zh-CN" altLang="en-US"/>
           </a:p>
@@ -1838,7 +1838,7 @@
           <a:p>
             <a:fld id="{C39C68C5-D724-4B50-A561-B354F4A5D368}" type="datetimeFigureOut">
               <a:rPr lang="zh-CN" altLang="en-US" smtClean="0"/>
-              <a:t>2021/10/31</a:t>
+              <a:t>2021/11/2</a:t>
             </a:fld>
             <a:endParaRPr lang="zh-CN" altLang="en-US"/>
           </a:p>
@@ -2202,7 +2202,7 @@
           <a:p>
             <a:fld id="{C39C68C5-D724-4B50-A561-B354F4A5D368}" type="datetimeFigureOut">
               <a:rPr lang="zh-CN" altLang="en-US" smtClean="0"/>
-              <a:t>2021/10/31</a:t>
+              <a:t>2021/11/2</a:t>
             </a:fld>
             <a:endParaRPr lang="zh-CN" altLang="en-US"/>
           </a:p>
@@ -2319,7 +2319,7 @@
           <a:p>
             <a:fld id="{C39C68C5-D724-4B50-A561-B354F4A5D368}" type="datetimeFigureOut">
               <a:rPr lang="zh-CN" altLang="en-US" smtClean="0"/>
-              <a:t>2021/10/31</a:t>
+              <a:t>2021/11/2</a:t>
             </a:fld>
             <a:endParaRPr lang="zh-CN" altLang="en-US"/>
           </a:p>
@@ -2414,7 +2414,7 @@
           <a:p>
             <a:fld id="{C39C68C5-D724-4B50-A561-B354F4A5D368}" type="datetimeFigureOut">
               <a:rPr lang="zh-CN" altLang="en-US" smtClean="0"/>
-              <a:t>2021/10/31</a:t>
+              <a:t>2021/11/2</a:t>
             </a:fld>
             <a:endParaRPr lang="zh-CN" altLang="en-US"/>
           </a:p>
@@ -2689,7 +2689,7 @@
           <a:p>
             <a:fld id="{C39C68C5-D724-4B50-A561-B354F4A5D368}" type="datetimeFigureOut">
               <a:rPr lang="zh-CN" altLang="en-US" smtClean="0"/>
-              <a:t>2021/10/31</a:t>
+              <a:t>2021/11/2</a:t>
             </a:fld>
             <a:endParaRPr lang="zh-CN" altLang="en-US"/>
           </a:p>
@@ -2941,7 +2941,7 @@
           <a:p>
             <a:fld id="{C39C68C5-D724-4B50-A561-B354F4A5D368}" type="datetimeFigureOut">
               <a:rPr lang="zh-CN" altLang="en-US" smtClean="0"/>
-              <a:t>2021/10/31</a:t>
+              <a:t>2021/11/2</a:t>
             </a:fld>
             <a:endParaRPr lang="zh-CN" altLang="en-US"/>
           </a:p>
@@ -3162,7 +3162,7 @@
           <a:p>
             <a:fld id="{C39C68C5-D724-4B50-A561-B354F4A5D368}" type="datetimeFigureOut">
               <a:rPr lang="zh-CN" altLang="en-US" smtClean="0"/>
-              <a:t>2021/10/31</a:t>
+              <a:t>2021/11/2</a:t>
             </a:fld>
             <a:endParaRPr lang="zh-CN" altLang="en-US"/>
           </a:p>
@@ -3623,7 +3623,7 @@
           <p:cNvPr id="3" name="标题 1">
             <a:extLst>
               <a:ext uri="{FF2B5EF4-FFF2-40B4-BE49-F238E27FC236}">
-                <a16:creationId xmlns="" xmlns:a16="http://schemas.microsoft.com/office/drawing/2014/main" id="{7D4229FA-2E26-4630-8915-D8ACA64945A8}"/>
+                <a16:creationId xmlns:a16="http://schemas.microsoft.com/office/drawing/2014/main" xmlns="" id="{7D4229FA-2E26-4630-8915-D8ACA64945A8}"/>
               </a:ext>
             </a:extLst>
           </p:cNvPr>
@@ -5166,19 +5166,7 @@
                           <a:ea typeface="+mn-ea"/>
                           <a:cs typeface="+mn-cs"/>
                         </a:rPr>
-                        <a:t>控制底盘运动当指定位置</a:t>
-                      </a:r>
-                      <a:r>
-                        <a:rPr lang="zh-CN" altLang="en-US" sz="1400" b="0" i="0" kern="1200" dirty="0" smtClean="0">
-                          <a:solidFill>
-                            <a:schemeClr val="dk1"/>
-                          </a:solidFill>
-                          <a:effectLst/>
-                          <a:latin typeface="+mn-lt"/>
-                          <a:ea typeface="+mn-ea"/>
-                          <a:cs typeface="+mn-cs"/>
-                        </a:rPr>
-                        <a:t>，坐标轴原点为上电位置</a:t>
+                        <a:t>控制底盘运动当指定位置，坐标轴原点为上电位置</a:t>
                       </a:r>
                       <a:endParaRPr lang="zh-CN" altLang="en-US" sz="1400" b="0" i="0" kern="1200" dirty="0">
                         <a:solidFill>
@@ -6341,11 +6329,7 @@
                       </a:r>
                       <a:r>
                         <a:rPr lang="en-US" altLang="zh-CN" sz="1400" dirty="0" smtClean="0"/>
-                        <a:t>(timeout=None</a:t>
-                      </a:r>
-                      <a:r>
-                        <a:rPr lang="en-US" altLang="zh-CN" sz="1400" dirty="0" smtClean="0"/>
-                        <a:t>)</a:t>
+                        <a:t>(timeout=None)</a:t>
                       </a:r>
                       <a:r>
                         <a:rPr lang="zh-CN" altLang="en-US" sz="1400" dirty="0" smtClean="0"/>
@@ -6706,7 +6690,7 @@
           <p:cNvPr id="4" name="内容占位符 5">
             <a:extLst>
               <a:ext uri="{FF2B5EF4-FFF2-40B4-BE49-F238E27FC236}">
-                <a16:creationId xmlns="" xmlns:a16="http://schemas.microsoft.com/office/drawing/2014/main" id="{DB26105E-A1FF-4E29-8ADB-0BAF8186333C}"/>
+                <a16:creationId xmlns:a16="http://schemas.microsoft.com/office/drawing/2014/main" xmlns="" id="{DB26105E-A1FF-4E29-8ADB-0BAF8186333C}"/>
               </a:ext>
             </a:extLst>
           </p:cNvPr>
@@ -6944,8 +6928,8 @@
           </a:p>
         </p:txBody>
       </p:sp>
-      <mc:AlternateContent xmlns:mc="http://schemas.openxmlformats.org/markup-compatibility/2006">
-        <mc:Choice xmlns:a14="http://schemas.microsoft.com/office/drawing/2010/main" Requires="a14">
+      <mc:AlternateContent xmlns:mc="http://schemas.openxmlformats.org/markup-compatibility/2006" xmlns:a14="http://schemas.microsoft.com/office/drawing/2010/main">
+        <mc:Choice Requires="a14">
           <p:sp>
             <p:nvSpPr>
               <p:cNvPr id="20" name="文本框 19"/>
@@ -7119,7 +7103,7 @@
             </p:txBody>
           </p:sp>
         </mc:Choice>
-        <mc:Fallback>
+        <mc:Fallback xmlns="">
           <p:sp>
             <p:nvSpPr>
               <p:cNvPr id="20" name="文本框 19"/>
@@ -7215,7 +7199,7 @@
           <p:cNvPr id="31" name="内容占位符 5">
             <a:extLst>
               <a:ext uri="{FF2B5EF4-FFF2-40B4-BE49-F238E27FC236}">
-                <a16:creationId xmlns="" xmlns:a16="http://schemas.microsoft.com/office/drawing/2014/main" id="{DB26105E-A1FF-4E29-8ADB-0BAF8186333C}"/>
+                <a16:creationId xmlns:a16="http://schemas.microsoft.com/office/drawing/2014/main" xmlns="" id="{DB26105E-A1FF-4E29-8ADB-0BAF8186333C}"/>
               </a:ext>
             </a:extLst>
           </p:cNvPr>
@@ -7586,8 +7570,8 @@
           </a:p>
         </p:txBody>
       </p:sp>
-      <mc:AlternateContent xmlns:mc="http://schemas.openxmlformats.org/markup-compatibility/2006">
-        <mc:Choice xmlns:a14="http://schemas.microsoft.com/office/drawing/2010/main" Requires="a14">
+      <mc:AlternateContent xmlns:mc="http://schemas.openxmlformats.org/markup-compatibility/2006" xmlns:a14="http://schemas.microsoft.com/office/drawing/2010/main">
+        <mc:Choice Requires="a14">
           <p:sp>
             <p:nvSpPr>
               <p:cNvPr id="48" name="文本框 47"/>
@@ -8154,7 +8138,7 @@
             </p:txBody>
           </p:sp>
         </mc:Choice>
-        <mc:Fallback>
+        <mc:Fallback xmlns="">
           <p:sp>
             <p:nvSpPr>
               <p:cNvPr id="48" name="文本框 47"/>
@@ -8193,8 +8177,8 @@
           </p:sp>
         </mc:Fallback>
       </mc:AlternateContent>
-      <mc:AlternateContent xmlns:mc="http://schemas.openxmlformats.org/markup-compatibility/2006">
-        <mc:Choice xmlns:a14="http://schemas.microsoft.com/office/drawing/2010/main" Requires="a14">
+      <mc:AlternateContent xmlns:mc="http://schemas.openxmlformats.org/markup-compatibility/2006" xmlns:a14="http://schemas.microsoft.com/office/drawing/2010/main">
+        <mc:Choice Requires="a14">
           <p:sp>
             <p:nvSpPr>
               <p:cNvPr id="49" name="文本框 48"/>
@@ -8251,7 +8235,7 @@
             </p:txBody>
           </p:sp>
         </mc:Choice>
-        <mc:Fallback>
+        <mc:Fallback xmlns="">
           <p:sp>
             <p:nvSpPr>
               <p:cNvPr id="49" name="文本框 48"/>
@@ -8357,7 +8341,7 @@
           <p:cNvPr id="40" name="内容占位符 5">
             <a:extLst>
               <a:ext uri="{FF2B5EF4-FFF2-40B4-BE49-F238E27FC236}">
-                <a16:creationId xmlns="" xmlns:a16="http://schemas.microsoft.com/office/drawing/2014/main" id="{DB26105E-A1FF-4E29-8ADB-0BAF8186333C}"/>
+                <a16:creationId xmlns:a16="http://schemas.microsoft.com/office/drawing/2014/main" xmlns="" id="{DB26105E-A1FF-4E29-8ADB-0BAF8186333C}"/>
               </a:ext>
             </a:extLst>
           </p:cNvPr>
@@ -8676,8 +8660,8 @@
           </a:p>
         </p:txBody>
       </p:sp>
-      <mc:AlternateContent xmlns:mc="http://schemas.openxmlformats.org/markup-compatibility/2006">
-        <mc:Choice xmlns:a14="http://schemas.microsoft.com/office/drawing/2010/main" Requires="a14">
+      <mc:AlternateContent xmlns:mc="http://schemas.openxmlformats.org/markup-compatibility/2006" xmlns:a14="http://schemas.microsoft.com/office/drawing/2010/main">
+        <mc:Choice Requires="a14">
           <p:sp>
             <p:nvSpPr>
               <p:cNvPr id="55" name="文本框 54"/>
@@ -8750,7 +8734,7 @@
             </p:txBody>
           </p:sp>
         </mc:Choice>
-        <mc:Fallback>
+        <mc:Fallback xmlns="">
           <p:sp>
             <p:nvSpPr>
               <p:cNvPr id="55" name="文本框 54"/>
@@ -8841,8 +8825,8 @@
           </a:p>
         </p:txBody>
       </p:sp>
-      <mc:AlternateContent xmlns:mc="http://schemas.openxmlformats.org/markup-compatibility/2006">
-        <mc:Choice xmlns:a14="http://schemas.microsoft.com/office/drawing/2010/main" Requires="a14">
+      <mc:AlternateContent xmlns:mc="http://schemas.openxmlformats.org/markup-compatibility/2006" xmlns:a14="http://schemas.microsoft.com/office/drawing/2010/main">
+        <mc:Choice Requires="a14">
           <p:sp>
             <p:nvSpPr>
               <p:cNvPr id="57" name="文本框 56"/>
@@ -9745,7 +9729,7 @@
             </p:txBody>
           </p:sp>
         </mc:Choice>
-        <mc:Fallback>
+        <mc:Fallback xmlns="">
           <p:sp>
             <p:nvSpPr>
               <p:cNvPr id="57" name="文本框 56"/>
@@ -11588,7 +11572,7 @@
         </p:blipFill>
         <p:spPr bwMode="auto">
           <a:xfrm>
-            <a:off x="971005" y="3949832"/>
+            <a:off x="971005" y="3653734"/>
             <a:ext cx="3299409" cy="2121965"/>
           </a:xfrm>
           <a:prstGeom prst="rect">
@@ -11625,7 +11609,7 @@
         </p:blipFill>
         <p:spPr bwMode="auto">
           <a:xfrm>
-            <a:off x="4466927" y="3949832"/>
+            <a:off x="4466927" y="3653734"/>
             <a:ext cx="3255797" cy="2093916"/>
           </a:xfrm>
           <a:prstGeom prst="rect">
@@ -11941,6 +11925,72 @@
               <a:t>直至稳态误差和响应速度达到要求</a:t>
             </a:r>
             <a:endParaRPr lang="zh-CN" altLang="en-US" baseline="-25000" dirty="0">
+              <a:solidFill>
+                <a:schemeClr val="bg1"/>
+              </a:solidFill>
+            </a:endParaRPr>
+          </a:p>
+        </p:txBody>
+      </p:sp>
+      <p:sp>
+        <p:nvSpPr>
+          <p:cNvPr id="11" name="文本框 10"/>
+          <p:cNvSpPr txBox="1"/>
+          <p:nvPr/>
+        </p:nvSpPr>
+        <p:spPr>
+          <a:xfrm>
+            <a:off x="971005" y="5775699"/>
+            <a:ext cx="3982350" cy="307777"/>
+          </a:xfrm>
+          <a:prstGeom prst="rect">
+            <a:avLst/>
+          </a:prstGeom>
+          <a:noFill/>
+        </p:spPr>
+        <p:txBody>
+          <a:bodyPr wrap="square" rtlCol="0">
+            <a:spAutoFit/>
+          </a:bodyPr>
+          <a:lstStyle/>
+          <a:p>
+            <a:r>
+              <a:rPr lang="zh-CN" altLang="en-US" sz="1400" dirty="0" smtClean="0">
+                <a:solidFill>
+                  <a:schemeClr val="bg1"/>
+                </a:solidFill>
+                <a:latin typeface="Cambria Math" panose="02040503050406030204" pitchFamily="18" charset="0"/>
+              </a:rPr>
+              <a:t>以上图片中积分项</a:t>
+            </a:r>
+            <a:r>
+              <a:rPr lang="en-US" altLang="zh-CN" sz="1400" dirty="0" err="1" smtClean="0">
+                <a:solidFill>
+                  <a:schemeClr val="bg1"/>
+                </a:solidFill>
+                <a:latin typeface="Cambria Math" panose="02040503050406030204" pitchFamily="18" charset="0"/>
+              </a:rPr>
+              <a:t>sum_err</a:t>
+            </a:r>
+            <a:r>
+              <a:rPr lang="zh-CN" altLang="en-US" sz="1400" dirty="0" smtClean="0">
+                <a:solidFill>
+                  <a:schemeClr val="bg1"/>
+                </a:solidFill>
+                <a:latin typeface="Cambria Math" panose="02040503050406030204" pitchFamily="18" charset="0"/>
+              </a:rPr>
+              <a:t>被除以</a:t>
+            </a:r>
+            <a:r>
+              <a:rPr lang="en-US" altLang="zh-CN" sz="1400" dirty="0" smtClean="0">
+                <a:solidFill>
+                  <a:schemeClr val="bg1"/>
+                </a:solidFill>
+                <a:latin typeface="Cambria Math" panose="02040503050406030204" pitchFamily="18" charset="0"/>
+              </a:rPr>
+              <a:t>10</a:t>
+            </a:r>
+            <a:endParaRPr lang="zh-CN" altLang="en-US" sz="1400" baseline="-25000" dirty="0">
               <a:solidFill>
                 <a:schemeClr val="bg1"/>
               </a:solidFill>
@@ -12086,6 +12136,41 @@
                                   </p:childTnLst>
                                 </p:cTn>
                               </p:par>
+                              <p:par>
+                                <p:cTn id="14" presetID="10" presetClass="entr" presetSubtype="0" fill="hold" grpId="0" nodeType="withEffect">
+                                  <p:stCondLst>
+                                    <p:cond delay="0"/>
+                                  </p:stCondLst>
+                                  <p:childTnLst>
+                                    <p:set>
+                                      <p:cBhvr>
+                                        <p:cTn id="15" dur="1" fill="hold">
+                                          <p:stCondLst>
+                                            <p:cond delay="0"/>
+                                          </p:stCondLst>
+                                        </p:cTn>
+                                        <p:tgtEl>
+                                          <p:spTgt spid="11"/>
+                                        </p:tgtEl>
+                                        <p:attrNameLst>
+                                          <p:attrName>style.visibility</p:attrName>
+                                        </p:attrNameLst>
+                                      </p:cBhvr>
+                                      <p:to>
+                                        <p:strVal val="visible"/>
+                                      </p:to>
+                                    </p:set>
+                                    <p:animEffect transition="in" filter="fade">
+                                      <p:cBhvr>
+                                        <p:cTn id="16" dur="500"/>
+                                        <p:tgtEl>
+                                          <p:spTgt spid="11"/>
+                                        </p:tgtEl>
+                                      </p:cBhvr>
+                                    </p:animEffect>
+                                  </p:childTnLst>
+                                </p:cTn>
+                              </p:par>
                             </p:childTnLst>
                           </p:cTn>
                         </p:par>
@@ -12117,6 +12202,7 @@
       <p:bldP spid="61" grpId="0"/>
       <p:bldP spid="62" grpId="0"/>
       <p:bldP spid="63" grpId="0"/>
+      <p:bldP spid="11" grpId="0"/>
     </p:bldLst>
   </p:timing>
 </p:sld>

</xml_diff>